<commit_message>
Final documentation part 1
</commit_message>
<xml_diff>
--- a/docs/BMI Tracker.pptx
+++ b/docs/BMI Tracker.pptx
@@ -7,6 +7,11 @@
   <p:sldIdLst>
     <p:sldId id="256" r:id="rId2"/>
     <p:sldId id="257" r:id="rId3"/>
+    <p:sldId id="258" r:id="rId4"/>
+    <p:sldId id="259" r:id="rId5"/>
+    <p:sldId id="260" r:id="rId6"/>
+    <p:sldId id="261" r:id="rId7"/>
+    <p:sldId id="262" r:id="rId8"/>
   </p:sldIdLst>
   <p:sldSz cx="12192000" cy="6858000"/>
   <p:notesSz cx="6858000" cy="9144000"/>
@@ -105,6 +110,11 @@
       </a:defRPr>
     </a:lvl9pPr>
   </p:defaultTextStyle>
+  <p:extLst>
+    <p:ext uri="{EFAFB233-063F-42B5-8137-9DF3F51BA10A}">
+      <p15:sldGuideLst xmlns:p15="http://schemas.microsoft.com/office/powerpoint/2012/main"/>
+    </p:ext>
+  </p:extLst>
 </p:presentation>
 </file>
 
@@ -831,7 +841,7 @@
             <a:fld id="{B61BEF0D-F0BB-DE4B-95CE-6DB70DBA9567}" type="datetimeFigureOut">
               <a:rPr lang="en-US" dirty="0"/>
               <a:pPr/>
-              <a:t>4/19/2018</a:t>
+              <a:t>4/24/2018</a:t>
             </a:fld>
             <a:endParaRPr lang="en-US" dirty="0"/>
           </a:p>
@@ -1079,7 +1089,7 @@
             <a:fld id="{B61BEF0D-F0BB-DE4B-95CE-6DB70DBA9567}" type="datetimeFigureOut">
               <a:rPr lang="en-US" dirty="0"/>
               <a:pPr/>
-              <a:t>4/19/2018</a:t>
+              <a:t>4/24/2018</a:t>
             </a:fld>
             <a:endParaRPr lang="en-US" dirty="0"/>
           </a:p>
@@ -1390,7 +1400,7 @@
             <a:fld id="{B61BEF0D-F0BB-DE4B-95CE-6DB70DBA9567}" type="datetimeFigureOut">
               <a:rPr lang="en-US" dirty="0"/>
               <a:pPr/>
-              <a:t>4/19/2018</a:t>
+              <a:t>4/24/2018</a:t>
             </a:fld>
             <a:endParaRPr lang="en-US" dirty="0"/>
           </a:p>
@@ -1728,7 +1738,7 @@
             <a:fld id="{B61BEF0D-F0BB-DE4B-95CE-6DB70DBA9567}" type="datetimeFigureOut">
               <a:rPr lang="en-US" dirty="0"/>
               <a:pPr/>
-              <a:t>4/19/2018</a:t>
+              <a:t>4/24/2018</a:t>
             </a:fld>
             <a:endParaRPr lang="en-US" dirty="0"/>
           </a:p>
@@ -2039,7 +2049,7 @@
             <a:fld id="{B61BEF0D-F0BB-DE4B-95CE-6DB70DBA9567}" type="datetimeFigureOut">
               <a:rPr lang="en-US" dirty="0"/>
               <a:pPr/>
-              <a:t>4/19/2018</a:t>
+              <a:t>4/24/2018</a:t>
             </a:fld>
             <a:endParaRPr lang="en-US" dirty="0"/>
           </a:p>
@@ -2429,7 +2439,7 @@
             <a:fld id="{B61BEF0D-F0BB-DE4B-95CE-6DB70DBA9567}" type="datetimeFigureOut">
               <a:rPr lang="en-US" dirty="0"/>
               <a:pPr/>
-              <a:t>4/19/2018</a:t>
+              <a:t>4/24/2018</a:t>
             </a:fld>
             <a:endParaRPr lang="en-US" dirty="0"/>
           </a:p>
@@ -2595,7 +2605,7 @@
           <a:p>
             <a:fld id="{55C6B4A9-1611-4792-9094-5F34BCA07E0B}" type="datetimeFigureOut">
               <a:rPr lang="en-US" dirty="0"/>
-              <a:t>4/19/2018</a:t>
+              <a:t>4/24/2018</a:t>
             </a:fld>
             <a:endParaRPr lang="en-US" dirty="0"/>
           </a:p>
@@ -2771,7 +2781,7 @@
             <a:fld id="{B61BEF0D-F0BB-DE4B-95CE-6DB70DBA9567}" type="datetimeFigureOut">
               <a:rPr lang="en-US" dirty="0"/>
               <a:pPr/>
-              <a:t>4/19/2018</a:t>
+              <a:t>4/24/2018</a:t>
             </a:fld>
             <a:endParaRPr lang="en-US" dirty="0"/>
           </a:p>
@@ -2944,7 +2954,7 @@
             <a:fld id="{B61BEF0D-F0BB-DE4B-95CE-6DB70DBA9567}" type="datetimeFigureOut">
               <a:rPr lang="en-US" dirty="0"/>
               <a:pPr/>
-              <a:t>4/19/2018</a:t>
+              <a:t>4/24/2018</a:t>
             </a:fld>
             <a:endParaRPr lang="en-US" dirty="0"/>
           </a:p>
@@ -3188,7 +3198,7 @@
             <a:fld id="{B61BEF0D-F0BB-DE4B-95CE-6DB70DBA9567}" type="datetimeFigureOut">
               <a:rPr lang="en-US" dirty="0"/>
               <a:pPr/>
-              <a:t>4/19/2018</a:t>
+              <a:t>4/24/2018</a:t>
             </a:fld>
             <a:endParaRPr lang="en-US" dirty="0"/>
           </a:p>
@@ -3416,7 +3426,7 @@
           <a:p>
             <a:fld id="{EB712588-04B1-427B-82EE-E8DB90309F08}" type="datetimeFigureOut">
               <a:rPr lang="en-US" dirty="0"/>
-              <a:t>4/19/2018</a:t>
+              <a:t>4/24/2018</a:t>
             </a:fld>
             <a:endParaRPr lang="en-US" dirty="0"/>
           </a:p>
@@ -3786,7 +3796,7 @@
             <a:fld id="{B61BEF0D-F0BB-DE4B-95CE-6DB70DBA9567}" type="datetimeFigureOut">
               <a:rPr lang="en-US" dirty="0"/>
               <a:pPr/>
-              <a:t>4/19/2018</a:t>
+              <a:t>4/24/2018</a:t>
             </a:fld>
             <a:endParaRPr lang="en-US" dirty="0"/>
           </a:p>
@@ -3906,7 +3916,7 @@
             <a:fld id="{B61BEF0D-F0BB-DE4B-95CE-6DB70DBA9567}" type="datetimeFigureOut">
               <a:rPr lang="en-US" dirty="0"/>
               <a:pPr/>
-              <a:t>4/19/2018</a:t>
+              <a:t>4/24/2018</a:t>
             </a:fld>
             <a:endParaRPr lang="en-US" dirty="0"/>
           </a:p>
@@ -3998,7 +4008,7 @@
             <a:fld id="{B61BEF0D-F0BB-DE4B-95CE-6DB70DBA9567}" type="datetimeFigureOut">
               <a:rPr lang="en-US" dirty="0"/>
               <a:pPr/>
-              <a:t>4/19/2018</a:t>
+              <a:t>4/24/2018</a:t>
             </a:fld>
             <a:endParaRPr lang="en-US" dirty="0"/>
           </a:p>
@@ -4249,7 +4259,7 @@
           <a:p>
             <a:fld id="{42A54C80-263E-416B-A8E0-580EDEADCBDC}" type="datetimeFigureOut">
               <a:rPr lang="en-US" dirty="0"/>
-              <a:t>4/19/2018</a:t>
+              <a:t>4/24/2018</a:t>
             </a:fld>
             <a:endParaRPr lang="en-US" dirty="0"/>
           </a:p>
@@ -4508,7 +4518,7 @@
             <a:fld id="{B61BEF0D-F0BB-DE4B-95CE-6DB70DBA9567}" type="datetimeFigureOut">
               <a:rPr lang="en-US" dirty="0"/>
               <a:pPr/>
-              <a:t>4/19/2018</a:t>
+              <a:t>4/24/2018</a:t>
             </a:fld>
             <a:endParaRPr lang="en-US" dirty="0"/>
           </a:p>
@@ -5248,7 +5258,7 @@
             <a:fld id="{B61BEF0D-F0BB-DE4B-95CE-6DB70DBA9567}" type="datetimeFigureOut">
               <a:rPr lang="en-US" dirty="0"/>
               <a:pPr/>
-              <a:t>4/19/2018</a:t>
+              <a:t>4/24/2018</a:t>
             </a:fld>
             <a:endParaRPr lang="en-US" dirty="0"/>
           </a:p>
@@ -5918,12 +5928,35 @@
             </a:r>
           </a:p>
           <a:p>
+            <a:pPr lvl="1"/>
+            <a:r>
+              <a:rPr lang="en-GB" dirty="0"/>
+              <a:t>Calculate BMI and record users weight</a:t>
+            </a:r>
+          </a:p>
+          <a:p>
             <a:endParaRPr lang="en-GB" dirty="0"/>
           </a:p>
           <a:p>
             <a:r>
               <a:rPr lang="en-GB" dirty="0"/>
               <a:t>To record weight loss over period of time</a:t>
+            </a:r>
+          </a:p>
+          <a:p>
+            <a:endParaRPr lang="en-GB" dirty="0"/>
+          </a:p>
+          <a:p>
+            <a:r>
+              <a:rPr lang="en-GB" dirty="0"/>
+              <a:t>To provide information for dieting options and exercises</a:t>
+            </a:r>
+          </a:p>
+          <a:p>
+            <a:pPr lvl="1"/>
+            <a:r>
+              <a:rPr lang="en-GB" dirty="0"/>
+              <a:t>Links to websites and articles</a:t>
             </a:r>
           </a:p>
         </p:txBody>
@@ -5932,6 +5965,685 @@
     <p:extLst>
       <p:ext uri="{BB962C8B-B14F-4D97-AF65-F5344CB8AC3E}">
         <p14:creationId xmlns:p14="http://schemas.microsoft.com/office/powerpoint/2010/main" val="3984139782"/>
+      </p:ext>
+    </p:extLst>
+  </p:cSld>
+  <p:clrMapOvr>
+    <a:masterClrMapping/>
+  </p:clrMapOvr>
+</p:sld>
+</file>
+
+<file path=ppt/slides/slide3.xml><?xml version="1.0" encoding="utf-8"?>
+<p:sld xmlns:a="http://schemas.openxmlformats.org/drawingml/2006/main" xmlns:r="http://schemas.openxmlformats.org/officeDocument/2006/relationships" xmlns:p="http://schemas.openxmlformats.org/presentationml/2006/main">
+  <p:cSld>
+    <p:spTree>
+      <p:nvGrpSpPr>
+        <p:cNvPr id="1" name=""/>
+        <p:cNvGrpSpPr/>
+        <p:nvPr/>
+      </p:nvGrpSpPr>
+      <p:grpSpPr>
+        <a:xfrm>
+          <a:off x="0" y="0"/>
+          <a:ext cx="0" cy="0"/>
+          <a:chOff x="0" y="0"/>
+          <a:chExt cx="0" cy="0"/>
+        </a:xfrm>
+      </p:grpSpPr>
+      <p:sp>
+        <p:nvSpPr>
+          <p:cNvPr id="2" name="Title 1">
+            <a:extLst>
+              <a:ext uri="{FF2B5EF4-FFF2-40B4-BE49-F238E27FC236}">
+                <a16:creationId xmlns:a16="http://schemas.microsoft.com/office/drawing/2014/main" id="{F75D05C1-7638-4655-9112-BB99A8A1AF18}"/>
+              </a:ext>
+            </a:extLst>
+          </p:cNvPr>
+          <p:cNvSpPr>
+            <a:spLocks noGrp="1"/>
+          </p:cNvSpPr>
+          <p:nvPr>
+            <p:ph type="title"/>
+          </p:nvPr>
+        </p:nvSpPr>
+        <p:spPr/>
+        <p:txBody>
+          <a:bodyPr/>
+          <a:lstStyle/>
+          <a:p>
+            <a:r>
+              <a:rPr lang="en-GB" dirty="0"/>
+              <a:t>Functional Requirements</a:t>
+            </a:r>
+          </a:p>
+        </p:txBody>
+      </p:sp>
+      <p:sp>
+        <p:nvSpPr>
+          <p:cNvPr id="3" name="Content Placeholder 2">
+            <a:extLst>
+              <a:ext uri="{FF2B5EF4-FFF2-40B4-BE49-F238E27FC236}">
+                <a16:creationId xmlns:a16="http://schemas.microsoft.com/office/drawing/2014/main" id="{C1BC6743-0DC8-49F1-A554-E1F1FF3E1925}"/>
+              </a:ext>
+            </a:extLst>
+          </p:cNvPr>
+          <p:cNvSpPr>
+            <a:spLocks noGrp="1"/>
+          </p:cNvSpPr>
+          <p:nvPr>
+            <p:ph idx="1"/>
+          </p:nvPr>
+        </p:nvSpPr>
+        <p:spPr>
+          <a:xfrm>
+            <a:off x="677334" y="1577009"/>
+            <a:ext cx="8596668" cy="4850295"/>
+          </a:xfrm>
+        </p:spPr>
+        <p:txBody>
+          <a:bodyPr>
+            <a:normAutofit fontScale="92500" lnSpcReduction="10000"/>
+          </a:bodyPr>
+          <a:lstStyle/>
+          <a:p>
+            <a:r>
+              <a:rPr lang="en-GB" dirty="0"/>
+              <a:t>The user will need to enter their current weight into a text box.</a:t>
+            </a:r>
+          </a:p>
+          <a:p>
+            <a:r>
+              <a:rPr lang="en-GB" dirty="0"/>
+              <a:t>The user will need to enter their current height into a text box.</a:t>
+            </a:r>
+          </a:p>
+          <a:p>
+            <a:r>
+              <a:rPr lang="en-GB" dirty="0"/>
+              <a:t>The user will need to enter their name into a text box.</a:t>
+            </a:r>
+          </a:p>
+          <a:p>
+            <a:r>
+              <a:rPr lang="en-GB" dirty="0"/>
+              <a:t>The program will calculate the users BMI by performing this calculation:</a:t>
+            </a:r>
+          </a:p>
+          <a:p>
+            <a:endParaRPr lang="en-GB" dirty="0"/>
+          </a:p>
+          <a:p>
+            <a:pPr marL="0" indent="0">
+              <a:buNone/>
+            </a:pPr>
+            <a:r>
+              <a:rPr lang="en-GB" dirty="0"/>
+              <a:t>	</a:t>
+            </a:r>
+            <a:r>
+              <a:rPr lang="en-GB" i="1" dirty="0"/>
+              <a:t>Get HEIGHT from KEYBOARD,</a:t>
+            </a:r>
+          </a:p>
+          <a:p>
+            <a:pPr marL="0" indent="0">
+              <a:buNone/>
+            </a:pPr>
+            <a:r>
+              <a:rPr lang="en-GB" i="1" dirty="0"/>
+              <a:t>	Get WEIGHT from KEYBOARD,</a:t>
+            </a:r>
+          </a:p>
+          <a:p>
+            <a:pPr marL="0" indent="0">
+              <a:buNone/>
+            </a:pPr>
+            <a:r>
+              <a:rPr lang="en-GB" i="1" dirty="0"/>
+              <a:t>	</a:t>
+            </a:r>
+            <a:r>
+              <a:rPr lang="en-GB" i="1" dirty="0" err="1"/>
+              <a:t>cmToM</a:t>
+            </a:r>
+            <a:r>
+              <a:rPr lang="en-GB" i="1" dirty="0"/>
+              <a:t> equals HEIGHT / 100</a:t>
+            </a:r>
+          </a:p>
+          <a:p>
+            <a:pPr marL="0" indent="0">
+              <a:buNone/>
+            </a:pPr>
+            <a:r>
+              <a:rPr lang="en-GB" i="1" dirty="0"/>
+              <a:t>	BMI equals ((WEIGHT / </a:t>
+            </a:r>
+            <a:r>
+              <a:rPr lang="en-GB" i="1" dirty="0" err="1"/>
+              <a:t>cmToM</a:t>
+            </a:r>
+            <a:r>
+              <a:rPr lang="en-GB" i="1" dirty="0"/>
+              <a:t>) / </a:t>
+            </a:r>
+            <a:r>
+              <a:rPr lang="en-GB" i="1" dirty="0" err="1"/>
+              <a:t>cmToM</a:t>
+            </a:r>
+            <a:r>
+              <a:rPr lang="en-GB" i="1" dirty="0"/>
+              <a:t>)</a:t>
+            </a:r>
+          </a:p>
+          <a:p>
+            <a:pPr marL="0" indent="0">
+              <a:buNone/>
+            </a:pPr>
+            <a:r>
+              <a:rPr lang="en-GB" i="1" dirty="0"/>
+              <a:t>	DISPLAY BMI</a:t>
+            </a:r>
+          </a:p>
+          <a:p>
+            <a:endParaRPr lang="en-GB" dirty="0"/>
+          </a:p>
+          <a:p>
+            <a:r>
+              <a:rPr lang="en-GB" dirty="0"/>
+              <a:t>The program must clearly display the information to the monitor for the user to see.</a:t>
+            </a:r>
+          </a:p>
+        </p:txBody>
+      </p:sp>
+    </p:spTree>
+    <p:extLst>
+      <p:ext uri="{BB962C8B-B14F-4D97-AF65-F5344CB8AC3E}">
+        <p14:creationId xmlns:p14="http://schemas.microsoft.com/office/powerpoint/2010/main" val="2631600931"/>
+      </p:ext>
+    </p:extLst>
+  </p:cSld>
+  <p:clrMapOvr>
+    <a:masterClrMapping/>
+  </p:clrMapOvr>
+</p:sld>
+</file>
+
+<file path=ppt/slides/slide4.xml><?xml version="1.0" encoding="utf-8"?>
+<p:sld xmlns:a="http://schemas.openxmlformats.org/drawingml/2006/main" xmlns:r="http://schemas.openxmlformats.org/officeDocument/2006/relationships" xmlns:p="http://schemas.openxmlformats.org/presentationml/2006/main">
+  <p:cSld>
+    <p:spTree>
+      <p:nvGrpSpPr>
+        <p:cNvPr id="1" name=""/>
+        <p:cNvGrpSpPr/>
+        <p:nvPr/>
+      </p:nvGrpSpPr>
+      <p:grpSpPr>
+        <a:xfrm>
+          <a:off x="0" y="0"/>
+          <a:ext cx="0" cy="0"/>
+          <a:chOff x="0" y="0"/>
+          <a:chExt cx="0" cy="0"/>
+        </a:xfrm>
+      </p:grpSpPr>
+      <p:sp>
+        <p:nvSpPr>
+          <p:cNvPr id="2" name="Title 1">
+            <a:extLst>
+              <a:ext uri="{FF2B5EF4-FFF2-40B4-BE49-F238E27FC236}">
+                <a16:creationId xmlns:a16="http://schemas.microsoft.com/office/drawing/2014/main" id="{19EB0D41-F533-4C6E-B20E-FBE786F23AD5}"/>
+              </a:ext>
+            </a:extLst>
+          </p:cNvPr>
+          <p:cNvSpPr>
+            <a:spLocks noGrp="1"/>
+          </p:cNvSpPr>
+          <p:nvPr>
+            <p:ph type="title"/>
+          </p:nvPr>
+        </p:nvSpPr>
+        <p:spPr/>
+        <p:txBody>
+          <a:bodyPr/>
+          <a:lstStyle/>
+          <a:p>
+            <a:r>
+              <a:rPr lang="en-GB" dirty="0"/>
+              <a:t>Non-Functional Requirements</a:t>
+            </a:r>
+          </a:p>
+        </p:txBody>
+      </p:sp>
+      <p:sp>
+        <p:nvSpPr>
+          <p:cNvPr id="3" name="Content Placeholder 2">
+            <a:extLst>
+              <a:ext uri="{FF2B5EF4-FFF2-40B4-BE49-F238E27FC236}">
+                <a16:creationId xmlns:a16="http://schemas.microsoft.com/office/drawing/2014/main" id="{1F8D3656-E800-4B92-A89F-3472F2B607B0}"/>
+              </a:ext>
+            </a:extLst>
+          </p:cNvPr>
+          <p:cNvSpPr>
+            <a:spLocks noGrp="1"/>
+          </p:cNvSpPr>
+          <p:nvPr>
+            <p:ph idx="1"/>
+          </p:nvPr>
+        </p:nvSpPr>
+        <p:spPr/>
+        <p:txBody>
+          <a:bodyPr/>
+          <a:lstStyle/>
+          <a:p>
+            <a:r>
+              <a:rPr lang="en-GB" dirty="0"/>
+              <a:t>Completion of project</a:t>
+            </a:r>
+          </a:p>
+          <a:p>
+            <a:endParaRPr lang="en-GB" dirty="0"/>
+          </a:p>
+          <a:p>
+            <a:r>
+              <a:rPr lang="en-GB" dirty="0"/>
+              <a:t>How fast it can process data</a:t>
+            </a:r>
+          </a:p>
+          <a:p>
+            <a:endParaRPr lang="en-GB" dirty="0"/>
+          </a:p>
+          <a:p>
+            <a:r>
+              <a:rPr lang="en-GB" dirty="0"/>
+              <a:t>Whether or not the user can troubleshoot and make repairs in the instance it crashes</a:t>
+            </a:r>
+          </a:p>
+          <a:p>
+            <a:endParaRPr lang="en-GB" dirty="0"/>
+          </a:p>
+          <a:p>
+            <a:r>
+              <a:rPr lang="en-GB" dirty="0"/>
+              <a:t>Development of the application will be done on windows machines for a windows operating system</a:t>
+            </a:r>
+          </a:p>
+        </p:txBody>
+      </p:sp>
+    </p:spTree>
+    <p:extLst>
+      <p:ext uri="{BB962C8B-B14F-4D97-AF65-F5344CB8AC3E}">
+        <p14:creationId xmlns:p14="http://schemas.microsoft.com/office/powerpoint/2010/main" val="226270260"/>
+      </p:ext>
+    </p:extLst>
+  </p:cSld>
+  <p:clrMapOvr>
+    <a:masterClrMapping/>
+  </p:clrMapOvr>
+</p:sld>
+</file>
+
+<file path=ppt/slides/slide5.xml><?xml version="1.0" encoding="utf-8"?>
+<p:sld xmlns:a="http://schemas.openxmlformats.org/drawingml/2006/main" xmlns:r="http://schemas.openxmlformats.org/officeDocument/2006/relationships" xmlns:p="http://schemas.openxmlformats.org/presentationml/2006/main">
+  <p:cSld>
+    <p:spTree>
+      <p:nvGrpSpPr>
+        <p:cNvPr id="1" name=""/>
+        <p:cNvGrpSpPr/>
+        <p:nvPr/>
+      </p:nvGrpSpPr>
+      <p:grpSpPr>
+        <a:xfrm>
+          <a:off x="0" y="0"/>
+          <a:ext cx="0" cy="0"/>
+          <a:chOff x="0" y="0"/>
+          <a:chExt cx="0" cy="0"/>
+        </a:xfrm>
+      </p:grpSpPr>
+      <p:sp>
+        <p:nvSpPr>
+          <p:cNvPr id="2" name="Title 1">
+            <a:extLst>
+              <a:ext uri="{FF2B5EF4-FFF2-40B4-BE49-F238E27FC236}">
+                <a16:creationId xmlns:a16="http://schemas.microsoft.com/office/drawing/2014/main" id="{E7665E82-C2BD-4B41-A8DE-BBBAF52F6E1D}"/>
+              </a:ext>
+            </a:extLst>
+          </p:cNvPr>
+          <p:cNvSpPr>
+            <a:spLocks noGrp="1"/>
+          </p:cNvSpPr>
+          <p:nvPr>
+            <p:ph type="title"/>
+          </p:nvPr>
+        </p:nvSpPr>
+        <p:spPr/>
+        <p:txBody>
+          <a:bodyPr/>
+          <a:lstStyle/>
+          <a:p>
+            <a:r>
+              <a:rPr lang="en-GB" dirty="0"/>
+              <a:t>Hardware and Software</a:t>
+            </a:r>
+          </a:p>
+        </p:txBody>
+      </p:sp>
+      <p:sp>
+        <p:nvSpPr>
+          <p:cNvPr id="3" name="Content Placeholder 2">
+            <a:extLst>
+              <a:ext uri="{FF2B5EF4-FFF2-40B4-BE49-F238E27FC236}">
+                <a16:creationId xmlns:a16="http://schemas.microsoft.com/office/drawing/2014/main" id="{7AB32363-7C0D-4B1C-8040-87C771227000}"/>
+              </a:ext>
+            </a:extLst>
+          </p:cNvPr>
+          <p:cNvSpPr>
+            <a:spLocks noGrp="1"/>
+          </p:cNvSpPr>
+          <p:nvPr>
+            <p:ph idx="1"/>
+          </p:nvPr>
+        </p:nvSpPr>
+        <p:spPr/>
+        <p:txBody>
+          <a:bodyPr/>
+          <a:lstStyle/>
+          <a:p>
+            <a:r>
+              <a:rPr lang="en-GB" dirty="0"/>
+              <a:t>The application will be developed on a windows operating system on visual basic via visual studio.</a:t>
+            </a:r>
+          </a:p>
+          <a:p>
+            <a:endParaRPr lang="en-GB" dirty="0"/>
+          </a:p>
+          <a:p>
+            <a:r>
+              <a:rPr lang="en-GB" dirty="0"/>
+              <a:t>Documentation will be recorded via Microsoft word.</a:t>
+            </a:r>
+          </a:p>
+          <a:p>
+            <a:endParaRPr lang="en-GB" dirty="0"/>
+          </a:p>
+          <a:p>
+            <a:r>
+              <a:rPr lang="en-GB" dirty="0"/>
+              <a:t>We will be using GitKraken to exchange files and information.</a:t>
+            </a:r>
+          </a:p>
+          <a:p>
+            <a:endParaRPr lang="en-GB" dirty="0"/>
+          </a:p>
+          <a:p>
+            <a:r>
+              <a:rPr lang="en-GB" dirty="0"/>
+              <a:t>We will be using Facebook Messenger to communicate with each other.</a:t>
+            </a:r>
+          </a:p>
+        </p:txBody>
+      </p:sp>
+    </p:spTree>
+    <p:extLst>
+      <p:ext uri="{BB962C8B-B14F-4D97-AF65-F5344CB8AC3E}">
+        <p14:creationId xmlns:p14="http://schemas.microsoft.com/office/powerpoint/2010/main" val="1218786406"/>
+      </p:ext>
+    </p:extLst>
+  </p:cSld>
+  <p:clrMapOvr>
+    <a:masterClrMapping/>
+  </p:clrMapOvr>
+</p:sld>
+</file>
+
+<file path=ppt/slides/slide6.xml><?xml version="1.0" encoding="utf-8"?>
+<p:sld xmlns:a="http://schemas.openxmlformats.org/drawingml/2006/main" xmlns:r="http://schemas.openxmlformats.org/officeDocument/2006/relationships" xmlns:p="http://schemas.openxmlformats.org/presentationml/2006/main">
+  <p:cSld>
+    <p:spTree>
+      <p:nvGrpSpPr>
+        <p:cNvPr id="1" name=""/>
+        <p:cNvGrpSpPr/>
+        <p:nvPr/>
+      </p:nvGrpSpPr>
+      <p:grpSpPr>
+        <a:xfrm>
+          <a:off x="0" y="0"/>
+          <a:ext cx="0" cy="0"/>
+          <a:chOff x="0" y="0"/>
+          <a:chExt cx="0" cy="0"/>
+        </a:xfrm>
+      </p:grpSpPr>
+      <p:sp>
+        <p:nvSpPr>
+          <p:cNvPr id="2" name="Title 1">
+            <a:extLst>
+              <a:ext uri="{FF2B5EF4-FFF2-40B4-BE49-F238E27FC236}">
+                <a16:creationId xmlns:a16="http://schemas.microsoft.com/office/drawing/2014/main" id="{6333A52C-920A-4F3B-A6E9-E31CFF8AA4C7}"/>
+              </a:ext>
+            </a:extLst>
+          </p:cNvPr>
+          <p:cNvSpPr>
+            <a:spLocks noGrp="1"/>
+          </p:cNvSpPr>
+          <p:nvPr>
+            <p:ph type="title"/>
+          </p:nvPr>
+        </p:nvSpPr>
+        <p:spPr/>
+        <p:txBody>
+          <a:bodyPr/>
+          <a:lstStyle/>
+          <a:p>
+            <a:r>
+              <a:rPr lang="en-GB" dirty="0"/>
+              <a:t>Software Used</a:t>
+            </a:r>
+          </a:p>
+        </p:txBody>
+      </p:sp>
+      <p:sp>
+        <p:nvSpPr>
+          <p:cNvPr id="3" name="Content Placeholder 2">
+            <a:extLst>
+              <a:ext uri="{FF2B5EF4-FFF2-40B4-BE49-F238E27FC236}">
+                <a16:creationId xmlns:a16="http://schemas.microsoft.com/office/drawing/2014/main" id="{06CA2C2C-DA0F-4C6D-B372-7BC047642F8C}"/>
+              </a:ext>
+            </a:extLst>
+          </p:cNvPr>
+          <p:cNvSpPr>
+            <a:spLocks noGrp="1"/>
+          </p:cNvSpPr>
+          <p:nvPr>
+            <p:ph idx="1"/>
+          </p:nvPr>
+        </p:nvSpPr>
+        <p:spPr>
+          <a:xfrm>
+            <a:off x="677334" y="1431235"/>
+            <a:ext cx="8596668" cy="4610127"/>
+          </a:xfrm>
+        </p:spPr>
+        <p:txBody>
+          <a:bodyPr/>
+          <a:lstStyle/>
+          <a:p>
+            <a:r>
+              <a:rPr lang="en-GB" dirty="0"/>
+              <a:t>The advantages of using software to develop our application are:</a:t>
+            </a:r>
+          </a:p>
+          <a:p>
+            <a:pPr lvl="1"/>
+            <a:r>
+              <a:rPr lang="en-GB" dirty="0"/>
+              <a:t>Visual Basic is a graphic user interface based development tool which suits our application well.</a:t>
+            </a:r>
+          </a:p>
+          <a:p>
+            <a:pPr lvl="1"/>
+            <a:r>
+              <a:rPr lang="en-GB" dirty="0"/>
+              <a:t>All team members are familiar with this programming language.</a:t>
+            </a:r>
+          </a:p>
+          <a:p>
+            <a:pPr lvl="1"/>
+            <a:r>
+              <a:rPr lang="en-GB" dirty="0"/>
+              <a:t>Broad community of other developers who have posted similar problems with solutions online to help.</a:t>
+            </a:r>
+          </a:p>
+          <a:p>
+            <a:pPr lvl="1"/>
+            <a:endParaRPr lang="en-GB" dirty="0"/>
+          </a:p>
+          <a:p>
+            <a:r>
+              <a:rPr lang="en-GB" dirty="0"/>
+              <a:t>The disadvantages of using software to develop our application are:</a:t>
+            </a:r>
+          </a:p>
+          <a:p>
+            <a:pPr lvl="1"/>
+            <a:r>
+              <a:rPr lang="en-GB" dirty="0"/>
+              <a:t>Researching online takes time due to a variety of solutions for different versions.</a:t>
+            </a:r>
+          </a:p>
+          <a:p>
+            <a:pPr lvl="1"/>
+            <a:r>
+              <a:rPr lang="en-GB" dirty="0"/>
+              <a:t>Developing with Visual Basic slows down the machine in turn prolonging the development of the application.</a:t>
+            </a:r>
+          </a:p>
+          <a:p>
+            <a:pPr lvl="1"/>
+            <a:r>
+              <a:rPr lang="en-GB" dirty="0"/>
+              <a:t>Using GitKraken to exchange files is tedious as it’s not simple to use and understand</a:t>
+            </a:r>
+          </a:p>
+          <a:p>
+            <a:pPr lvl="1"/>
+            <a:endParaRPr lang="en-GB" dirty="0"/>
+          </a:p>
+        </p:txBody>
+      </p:sp>
+    </p:spTree>
+    <p:extLst>
+      <p:ext uri="{BB962C8B-B14F-4D97-AF65-F5344CB8AC3E}">
+        <p14:creationId xmlns:p14="http://schemas.microsoft.com/office/powerpoint/2010/main" val="1339961695"/>
+      </p:ext>
+    </p:extLst>
+  </p:cSld>
+  <p:clrMapOvr>
+    <a:masterClrMapping/>
+  </p:clrMapOvr>
+</p:sld>
+</file>
+
+<file path=ppt/slides/slide7.xml><?xml version="1.0" encoding="utf-8"?>
+<p:sld xmlns:a="http://schemas.openxmlformats.org/drawingml/2006/main" xmlns:r="http://schemas.openxmlformats.org/officeDocument/2006/relationships" xmlns:p="http://schemas.openxmlformats.org/presentationml/2006/main">
+  <p:cSld>
+    <p:spTree>
+      <p:nvGrpSpPr>
+        <p:cNvPr id="1" name=""/>
+        <p:cNvGrpSpPr/>
+        <p:nvPr/>
+      </p:nvGrpSpPr>
+      <p:grpSpPr>
+        <a:xfrm>
+          <a:off x="0" y="0"/>
+          <a:ext cx="0" cy="0"/>
+          <a:chOff x="0" y="0"/>
+          <a:chExt cx="0" cy="0"/>
+        </a:xfrm>
+      </p:grpSpPr>
+      <p:sp>
+        <p:nvSpPr>
+          <p:cNvPr id="2" name="Title 1">
+            <a:extLst>
+              <a:ext uri="{FF2B5EF4-FFF2-40B4-BE49-F238E27FC236}">
+                <a16:creationId xmlns:a16="http://schemas.microsoft.com/office/drawing/2014/main" id="{9CF63397-13D5-4967-8C26-6DB44DAB1E75}"/>
+              </a:ext>
+            </a:extLst>
+          </p:cNvPr>
+          <p:cNvSpPr>
+            <a:spLocks noGrp="1"/>
+          </p:cNvSpPr>
+          <p:nvPr>
+            <p:ph type="title"/>
+          </p:nvPr>
+        </p:nvSpPr>
+        <p:spPr/>
+        <p:txBody>
+          <a:bodyPr/>
+          <a:lstStyle/>
+          <a:p>
+            <a:r>
+              <a:rPr lang="en-GB" dirty="0"/>
+              <a:t>Hardware Used</a:t>
+            </a:r>
+          </a:p>
+        </p:txBody>
+      </p:sp>
+      <p:sp>
+        <p:nvSpPr>
+          <p:cNvPr id="3" name="Content Placeholder 2">
+            <a:extLst>
+              <a:ext uri="{FF2B5EF4-FFF2-40B4-BE49-F238E27FC236}">
+                <a16:creationId xmlns:a16="http://schemas.microsoft.com/office/drawing/2014/main" id="{2926E359-1EAD-4387-B18F-0289C6B05CCB}"/>
+              </a:ext>
+            </a:extLst>
+          </p:cNvPr>
+          <p:cNvSpPr>
+            <a:spLocks noGrp="1"/>
+          </p:cNvSpPr>
+          <p:nvPr>
+            <p:ph idx="1"/>
+          </p:nvPr>
+        </p:nvSpPr>
+        <p:spPr/>
+        <p:txBody>
+          <a:bodyPr/>
+          <a:lstStyle/>
+          <a:p>
+            <a:r>
+              <a:rPr lang="en-GB" dirty="0"/>
+              <a:t>We’ve been using our own personal machines to develop our application.</a:t>
+            </a:r>
+          </a:p>
+          <a:p>
+            <a:endParaRPr lang="en-GB" dirty="0"/>
+          </a:p>
+          <a:p>
+            <a:r>
+              <a:rPr lang="en-GB" dirty="0"/>
+              <a:t>The machines we’ve been using are Dell, HP, Lenovo, Samsung and Microsoft surface. </a:t>
+            </a:r>
+          </a:p>
+          <a:p>
+            <a:endParaRPr lang="en-GB" dirty="0"/>
+          </a:p>
+          <a:p>
+            <a:r>
+              <a:rPr lang="en-GB" dirty="0"/>
+              <a:t>To store our files we’ve been using the internal hard drives and external hard drives as well as a cloud share.</a:t>
+            </a:r>
+          </a:p>
+          <a:p>
+            <a:endParaRPr lang="en-GB" dirty="0"/>
+          </a:p>
+          <a:p>
+            <a:endParaRPr lang="en-GB" dirty="0"/>
+          </a:p>
+        </p:txBody>
+      </p:sp>
+    </p:spTree>
+    <p:extLst>
+      <p:ext uri="{BB962C8B-B14F-4D97-AF65-F5344CB8AC3E}">
+        <p14:creationId xmlns:p14="http://schemas.microsoft.com/office/powerpoint/2010/main" val="1624096900"/>
       </p:ext>
     </p:extLst>
   </p:cSld>

</xml_diff>